<commit_message>
Added project planning document Updated Dataflow diagrams in Dataflow.pptx
</commit_message>
<xml_diff>
--- a/Documentation/Dataflow.pptx
+++ b/Documentation/Dataflow.pptx
@@ -5,10 +5,9 @@
     <p:sldMasterId id="2147483648" r:id="rId1"/>
   </p:sldMasterIdLst>
   <p:sldIdLst>
-    <p:sldId id="256" r:id="rId2"/>
-    <p:sldId id="257" r:id="rId3"/>
-    <p:sldId id="260" r:id="rId4"/>
-    <p:sldId id="259" r:id="rId5"/>
+    <p:sldId id="257" r:id="rId2"/>
+    <p:sldId id="260" r:id="rId3"/>
+    <p:sldId id="259" r:id="rId4"/>
   </p:sldIdLst>
   <p:sldSz cx="12192000" cy="6858000"/>
   <p:notesSz cx="6858000" cy="9144000"/>
@@ -244,7 +243,7 @@
           <a:p>
             <a:fld id="{2720BED5-F1DB-4233-8469-C99F1BD85BAD}" type="datetimeFigureOut">
               <a:rPr lang="en-US" smtClean="0"/>
-              <a:t>11/29/16</a:t>
+              <a:t>12/07/16</a:t>
             </a:fld>
             <a:endParaRPr lang="en-US"/>
           </a:p>
@@ -412,7 +411,7 @@
           <a:p>
             <a:fld id="{2720BED5-F1DB-4233-8469-C99F1BD85BAD}" type="datetimeFigureOut">
               <a:rPr lang="en-US" smtClean="0"/>
-              <a:t>11/29/16</a:t>
+              <a:t>12/07/16</a:t>
             </a:fld>
             <a:endParaRPr lang="en-US"/>
           </a:p>
@@ -590,7 +589,7 @@
           <a:p>
             <a:fld id="{2720BED5-F1DB-4233-8469-C99F1BD85BAD}" type="datetimeFigureOut">
               <a:rPr lang="en-US" smtClean="0"/>
-              <a:t>11/29/16</a:t>
+              <a:t>12/07/16</a:t>
             </a:fld>
             <a:endParaRPr lang="en-US"/>
           </a:p>
@@ -758,7 +757,7 @@
           <a:p>
             <a:fld id="{2720BED5-F1DB-4233-8469-C99F1BD85BAD}" type="datetimeFigureOut">
               <a:rPr lang="en-US" smtClean="0"/>
-              <a:t>11/29/16</a:t>
+              <a:t>12/07/16</a:t>
             </a:fld>
             <a:endParaRPr lang="en-US"/>
           </a:p>
@@ -1003,7 +1002,7 @@
           <a:p>
             <a:fld id="{2720BED5-F1DB-4233-8469-C99F1BD85BAD}" type="datetimeFigureOut">
               <a:rPr lang="en-US" smtClean="0"/>
-              <a:t>11/29/16</a:t>
+              <a:t>12/07/16</a:t>
             </a:fld>
             <a:endParaRPr lang="en-US"/>
           </a:p>
@@ -1232,7 +1231,7 @@
           <a:p>
             <a:fld id="{2720BED5-F1DB-4233-8469-C99F1BD85BAD}" type="datetimeFigureOut">
               <a:rPr lang="en-US" smtClean="0"/>
-              <a:t>11/29/16</a:t>
+              <a:t>12/07/16</a:t>
             </a:fld>
             <a:endParaRPr lang="en-US"/>
           </a:p>
@@ -1596,7 +1595,7 @@
           <a:p>
             <a:fld id="{2720BED5-F1DB-4233-8469-C99F1BD85BAD}" type="datetimeFigureOut">
               <a:rPr lang="en-US" smtClean="0"/>
-              <a:t>11/29/16</a:t>
+              <a:t>12/07/16</a:t>
             </a:fld>
             <a:endParaRPr lang="en-US"/>
           </a:p>
@@ -1713,7 +1712,7 @@
           <a:p>
             <a:fld id="{2720BED5-F1DB-4233-8469-C99F1BD85BAD}" type="datetimeFigureOut">
               <a:rPr lang="en-US" smtClean="0"/>
-              <a:t>11/29/16</a:t>
+              <a:t>12/07/16</a:t>
             </a:fld>
             <a:endParaRPr lang="en-US"/>
           </a:p>
@@ -1808,7 +1807,7 @@
           <a:p>
             <a:fld id="{2720BED5-F1DB-4233-8469-C99F1BD85BAD}" type="datetimeFigureOut">
               <a:rPr lang="en-US" smtClean="0"/>
-              <a:t>11/29/16</a:t>
+              <a:t>12/07/16</a:t>
             </a:fld>
             <a:endParaRPr lang="en-US"/>
           </a:p>
@@ -2083,7 +2082,7 @@
           <a:p>
             <a:fld id="{2720BED5-F1DB-4233-8469-C99F1BD85BAD}" type="datetimeFigureOut">
               <a:rPr lang="en-US" smtClean="0"/>
-              <a:t>11/29/16</a:t>
+              <a:t>12/07/16</a:t>
             </a:fld>
             <a:endParaRPr lang="en-US"/>
           </a:p>
@@ -2335,7 +2334,7 @@
           <a:p>
             <a:fld id="{2720BED5-F1DB-4233-8469-C99F1BD85BAD}" type="datetimeFigureOut">
               <a:rPr lang="en-US" smtClean="0"/>
-              <a:t>11/29/16</a:t>
+              <a:t>12/07/16</a:t>
             </a:fld>
             <a:endParaRPr lang="en-US"/>
           </a:p>
@@ -2546,7 +2545,7 @@
           <a:p>
             <a:fld id="{2720BED5-F1DB-4233-8469-C99F1BD85BAD}" type="datetimeFigureOut">
               <a:rPr lang="en-US" smtClean="0"/>
-              <a:t>11/29/16</a:t>
+              <a:t>12/07/16</a:t>
             </a:fld>
             <a:endParaRPr lang="en-US"/>
           </a:p>
@@ -2961,40 +2960,7 @@
         </p:nvCxnSpPr>
         <p:spPr>
           <a:xfrm>
-            <a:off x="1238865" y="980768"/>
-            <a:ext cx="0" cy="5427406"/>
-          </a:xfrm>
-          <a:prstGeom prst="line">
-            <a:avLst/>
-          </a:prstGeom>
-          <a:ln w="38100"/>
-        </p:spPr>
-        <p:style>
-          <a:lnRef idx="1">
-            <a:schemeClr val="accent1"/>
-          </a:lnRef>
-          <a:fillRef idx="0">
-            <a:schemeClr val="accent1"/>
-          </a:fillRef>
-          <a:effectRef idx="0">
-            <a:schemeClr val="accent1"/>
-          </a:effectRef>
-          <a:fontRef idx="minor">
-            <a:schemeClr val="tx1"/>
-          </a:fontRef>
-        </p:style>
-      </p:cxnSp>
-      <p:cxnSp>
-        <p:nvCxnSpPr>
-          <p:cNvPr id="8" name="Straight Connector 7"/>
-          <p:cNvCxnSpPr>
-            <a:cxnSpLocks/>
-          </p:cNvCxnSpPr>
-          <p:nvPr/>
-        </p:nvCxnSpPr>
-        <p:spPr>
-          <a:xfrm>
-            <a:off x="10387781" y="980768"/>
+            <a:off x="1238865" y="1041360"/>
             <a:ext cx="0" cy="5427406"/>
           </a:xfrm>
           <a:prstGeom prst="line">
@@ -3027,7 +2993,7 @@
         </p:nvCxnSpPr>
         <p:spPr>
           <a:xfrm>
-            <a:off x="6007510" y="980768"/>
+            <a:off x="9453076" y="842346"/>
             <a:ext cx="0" cy="5427406"/>
           </a:xfrm>
           <a:prstGeom prst="line">
@@ -3058,7 +3024,7 @@
         </p:nvSpPr>
         <p:spPr>
           <a:xfrm>
-            <a:off x="921775" y="309716"/>
+            <a:off x="921775" y="565347"/>
             <a:ext cx="907025" cy="369332"/>
           </a:xfrm>
           <a:prstGeom prst="rect">
@@ -3081,13 +3047,13 @@
       </p:sp>
       <p:sp>
         <p:nvSpPr>
-          <p:cNvPr id="11" name="TextBox 10"/>
+          <p:cNvPr id="12" name="TextBox 11"/>
           <p:cNvSpPr txBox="1"/>
           <p:nvPr/>
         </p:nvSpPr>
         <p:spPr>
           <a:xfrm>
-            <a:off x="9699523" y="309716"/>
+            <a:off x="8695992" y="401894"/>
             <a:ext cx="1514167" cy="369332"/>
           </a:xfrm>
           <a:prstGeom prst="rect">
@@ -3101,27 +3067,57 @@
           </a:bodyPr>
           <a:lstStyle/>
           <a:p>
-            <a:r>
-              <a:rPr lang="en-US" dirty="0" err="1"/>
-              <a:t>ReviewBoard</a:t>
-            </a:r>
+            <a:pPr algn="ctr"/>
             <a:r>
               <a:rPr lang="en-US" dirty="0"/>
-              <a:t> </a:t>
-            </a:r>
-          </a:p>
-        </p:txBody>
-      </p:sp>
-      <p:sp>
-        <p:nvSpPr>
-          <p:cNvPr id="12" name="TextBox 11"/>
+              <a:t>Bot</a:t>
+            </a:r>
+          </a:p>
+        </p:txBody>
+      </p:sp>
+      <p:cxnSp>
+        <p:nvCxnSpPr>
+          <p:cNvPr id="3" name="Straight Arrow Connector 2"/>
+          <p:cNvCxnSpPr/>
+          <p:nvPr/>
+        </p:nvCxnSpPr>
+        <p:spPr>
+          <a:xfrm>
+            <a:off x="1633115" y="2077064"/>
+            <a:ext cx="7537389" cy="0"/>
+          </a:xfrm>
+          <a:prstGeom prst="straightConnector1">
+            <a:avLst/>
+          </a:prstGeom>
+          <a:ln w="76200">
+            <a:tailEnd type="triangle"/>
+          </a:ln>
+        </p:spPr>
+        <p:style>
+          <a:lnRef idx="1">
+            <a:schemeClr val="accent1"/>
+          </a:lnRef>
+          <a:fillRef idx="0">
+            <a:schemeClr val="accent1"/>
+          </a:fillRef>
+          <a:effectRef idx="0">
+            <a:schemeClr val="accent1"/>
+          </a:effectRef>
+          <a:fontRef idx="minor">
+            <a:schemeClr val="tx1"/>
+          </a:fontRef>
+        </p:style>
+      </p:cxnSp>
+      <p:sp>
+        <p:nvSpPr>
+          <p:cNvPr id="4" name="TextBox 3"/>
           <p:cNvSpPr txBox="1"/>
           <p:nvPr/>
         </p:nvSpPr>
         <p:spPr>
           <a:xfrm>
-            <a:off x="5385620" y="309716"/>
-            <a:ext cx="1514167" cy="369332"/>
+            <a:off x="4335706" y="1663964"/>
+            <a:ext cx="2610465" cy="369332"/>
           </a:xfrm>
           <a:prstGeom prst="rect">
             <a:avLst/>
@@ -3136,15 +3132,150 @@
           <a:p>
             <a:r>
               <a:rPr lang="en-US" dirty="0"/>
-              <a:t>Bot</a:t>
-            </a:r>
+              <a:t>Send 1</a:t>
+            </a:r>
+            <a:r>
+              <a:rPr lang="en-US" baseline="30000" dirty="0"/>
+              <a:t>st</a:t>
+            </a:r>
+            <a:r>
+              <a:rPr lang="en-US" dirty="0"/>
+              <a:t> message to bot</a:t>
+            </a:r>
+          </a:p>
+        </p:txBody>
+      </p:sp>
+      <p:sp>
+        <p:nvSpPr>
+          <p:cNvPr id="7" name="TextBox 6"/>
+          <p:cNvSpPr txBox="1"/>
+          <p:nvPr/>
+        </p:nvSpPr>
+        <p:spPr>
+          <a:xfrm>
+            <a:off x="0" y="32562"/>
+            <a:ext cx="2109019" cy="369332"/>
+          </a:xfrm>
+          <a:prstGeom prst="rect">
+            <a:avLst/>
+          </a:prstGeom>
+          <a:noFill/>
+        </p:spPr>
+        <p:txBody>
+          <a:bodyPr wrap="square" rtlCol="0">
+            <a:spAutoFit/>
+          </a:bodyPr>
+          <a:lstStyle/>
+          <a:p>
+            <a:r>
+              <a:rPr lang="en-US" b="1" dirty="0"/>
+              <a:t>Initial interaction</a:t>
+            </a:r>
+          </a:p>
+        </p:txBody>
+      </p:sp>
+      <p:sp>
+        <p:nvSpPr>
+          <p:cNvPr id="16" name="TextBox 15"/>
+          <p:cNvSpPr txBox="1"/>
+          <p:nvPr/>
+        </p:nvSpPr>
+        <p:spPr>
+          <a:xfrm>
+            <a:off x="2826142" y="4378044"/>
+            <a:ext cx="5151333" cy="369332"/>
+          </a:xfrm>
+          <a:prstGeom prst="rect">
+            <a:avLst/>
+          </a:prstGeom>
+          <a:noFill/>
+        </p:spPr>
+        <p:txBody>
+          <a:bodyPr wrap="square" rtlCol="0">
+            <a:spAutoFit/>
+          </a:bodyPr>
+          <a:lstStyle/>
+          <a:p>
+            <a:pPr algn="ctr"/>
+            <a:r>
+              <a:rPr lang="en-US" dirty="0"/>
+              <a:t>Bot sends back a new unique URL</a:t>
+            </a:r>
+          </a:p>
+        </p:txBody>
+      </p:sp>
+      <p:cxnSp>
+        <p:nvCxnSpPr>
+          <p:cNvPr id="17" name="Straight Arrow Connector 16"/>
+          <p:cNvCxnSpPr/>
+          <p:nvPr/>
+        </p:nvCxnSpPr>
+        <p:spPr>
+          <a:xfrm flipH="1">
+            <a:off x="1519082" y="4747376"/>
+            <a:ext cx="7651422" cy="0"/>
+          </a:xfrm>
+          <a:prstGeom prst="straightConnector1">
+            <a:avLst/>
+          </a:prstGeom>
+          <a:ln w="76200">
+            <a:tailEnd type="triangle"/>
+          </a:ln>
+        </p:spPr>
+        <p:style>
+          <a:lnRef idx="1">
+            <a:schemeClr val="accent1"/>
+          </a:lnRef>
+          <a:fillRef idx="0">
+            <a:schemeClr val="accent1"/>
+          </a:fillRef>
+          <a:effectRef idx="0">
+            <a:schemeClr val="accent1"/>
+          </a:effectRef>
+          <a:fontRef idx="minor">
+            <a:schemeClr val="tx1"/>
+          </a:fontRef>
+        </p:style>
+      </p:cxnSp>
+      <p:sp>
+        <p:nvSpPr>
+          <p:cNvPr id="11" name="TextBox 10"/>
+          <p:cNvSpPr txBox="1"/>
+          <p:nvPr/>
+        </p:nvSpPr>
+        <p:spPr>
+          <a:xfrm>
+            <a:off x="2826142" y="4747376"/>
+            <a:ext cx="5151333" cy="369332"/>
+          </a:xfrm>
+          <a:prstGeom prst="rect">
+            <a:avLst/>
+          </a:prstGeom>
+          <a:noFill/>
+        </p:spPr>
+        <p:txBody>
+          <a:bodyPr wrap="square" rtlCol="0">
+            <a:spAutoFit/>
+          </a:bodyPr>
+          <a:lstStyle/>
+          <a:p>
+            <a:pPr algn="ctr"/>
+            <a:r>
+              <a:rPr lang="en-US" dirty="0"/>
+              <a:t>that includes a conversation id and </a:t>
+            </a:r>
+            <a:r>
+              <a:rPr lang="en-US"/>
+              <a:t>a channel id</a:t>
+            </a:r>
+            <a:endParaRPr lang="en-US" dirty="0"/>
           </a:p>
         </p:txBody>
       </p:sp>
     </p:spTree>
     <p:extLst>
       <p:ext uri="{BB962C8B-B14F-4D97-AF65-F5344CB8AC3E}">
-        <p14:creationId xmlns:p14="http://schemas.microsoft.com/office/powerpoint/2010/main" val="3248198943"/>
+        <p14:creationId xmlns:p14="http://schemas.microsoft.com/office/powerpoint/2010/main" val="828466624"/>
       </p:ext>
     </p:extLst>
   </p:cSld>
@@ -3290,9 +3421,10 @@
           <a:p>
             <a:pPr algn="ctr"/>
             <a:r>
-              <a:rPr lang="en-US" dirty="0"/>
-              <a:t>Bot</a:t>
-            </a:r>
+              <a:rPr lang="en-US" dirty="0" err="1"/>
+              <a:t>ReviewBoard</a:t>
+            </a:r>
+            <a:endParaRPr lang="en-US" dirty="0"/>
           </a:p>
         </p:txBody>
       </p:sp>
@@ -3331,14 +3463,14 @@
       </p:cxnSp>
       <p:sp>
         <p:nvSpPr>
-          <p:cNvPr id="4" name="TextBox 3"/>
+          <p:cNvPr id="11" name="TextBox 10"/>
           <p:cNvSpPr txBox="1"/>
           <p:nvPr/>
         </p:nvSpPr>
         <p:spPr>
           <a:xfrm>
-            <a:off x="4335706" y="1663964"/>
-            <a:ext cx="2610465" cy="369332"/>
+            <a:off x="0" y="32562"/>
+            <a:ext cx="4151671" cy="369332"/>
           </a:xfrm>
           <a:prstGeom prst="rect">
             <a:avLst/>
@@ -3352,30 +3484,30 @@
           <a:lstStyle/>
           <a:p>
             <a:r>
-              <a:rPr lang="en-US" dirty="0"/>
-              <a:t>Send 1</a:t>
-            </a:r>
-            <a:r>
-              <a:rPr lang="en-US" baseline="30000" dirty="0"/>
-              <a:t>st</a:t>
-            </a:r>
-            <a:r>
-              <a:rPr lang="en-US" dirty="0"/>
-              <a:t> message to bot</a:t>
-            </a:r>
-          </a:p>
-        </p:txBody>
-      </p:sp>
-      <p:sp>
-        <p:nvSpPr>
-          <p:cNvPr id="7" name="TextBox 6"/>
+              <a:rPr lang="en-US" b="1" dirty="0"/>
+              <a:t>User and </a:t>
+            </a:r>
+            <a:r>
+              <a:rPr lang="en-US" b="1" dirty="0" err="1"/>
+              <a:t>ReviewBoard</a:t>
+            </a:r>
+            <a:r>
+              <a:rPr lang="en-US" b="1" dirty="0"/>
+              <a:t> Interaction</a:t>
+            </a:r>
+          </a:p>
+        </p:txBody>
+      </p:sp>
+      <p:sp>
+        <p:nvSpPr>
+          <p:cNvPr id="13" name="TextBox 12"/>
           <p:cNvSpPr txBox="1"/>
           <p:nvPr/>
         </p:nvSpPr>
         <p:spPr>
           <a:xfrm>
-            <a:off x="0" y="32562"/>
-            <a:ext cx="2109019" cy="369332"/>
+            <a:off x="2426082" y="2203787"/>
+            <a:ext cx="5839777" cy="1200329"/>
           </a:xfrm>
           <a:prstGeom prst="rect">
             <a:avLst/>
@@ -3389,114 +3521,31 @@
           <a:lstStyle/>
           <a:p>
             <a:r>
-              <a:rPr lang="en-US" b="1" dirty="0"/>
-              <a:t>Initial interaction</a:t>
-            </a:r>
-          </a:p>
-        </p:txBody>
-      </p:sp>
-      <p:sp>
-        <p:nvSpPr>
-          <p:cNvPr id="16" name="TextBox 15"/>
-          <p:cNvSpPr txBox="1"/>
-          <p:nvPr/>
-        </p:nvSpPr>
-        <p:spPr>
-          <a:xfrm>
-            <a:off x="2826142" y="4378044"/>
-            <a:ext cx="5151333" cy="369332"/>
-          </a:xfrm>
-          <a:prstGeom prst="rect">
-            <a:avLst/>
-          </a:prstGeom>
-          <a:noFill/>
-        </p:spPr>
-        <p:txBody>
-          <a:bodyPr wrap="square" rtlCol="0">
-            <a:spAutoFit/>
-          </a:bodyPr>
-          <a:lstStyle/>
-          <a:p>
-            <a:pPr algn="ctr"/>
-            <a:r>
               <a:rPr lang="en-US" dirty="0"/>
-              <a:t>Bot sends back a new unique URL</a:t>
-            </a:r>
-          </a:p>
-        </p:txBody>
-      </p:sp>
-      <p:cxnSp>
-        <p:nvCxnSpPr>
-          <p:cNvPr id="17" name="Straight Arrow Connector 16"/>
-          <p:cNvCxnSpPr/>
-          <p:nvPr/>
-        </p:nvCxnSpPr>
-        <p:spPr>
-          <a:xfrm flipH="1">
-            <a:off x="1519082" y="4747376"/>
-            <a:ext cx="7651422" cy="0"/>
-          </a:xfrm>
-          <a:prstGeom prst="straightConnector1">
-            <a:avLst/>
-          </a:prstGeom>
-          <a:ln w="76200">
-            <a:tailEnd type="triangle"/>
-          </a:ln>
-        </p:spPr>
-        <p:style>
-          <a:lnRef idx="1">
-            <a:schemeClr val="accent1"/>
-          </a:lnRef>
-          <a:fillRef idx="0">
-            <a:schemeClr val="accent1"/>
-          </a:fillRef>
-          <a:effectRef idx="0">
-            <a:schemeClr val="accent1"/>
-          </a:effectRef>
-          <a:fontRef idx="minor">
-            <a:schemeClr val="tx1"/>
-          </a:fontRef>
-        </p:style>
-      </p:cxnSp>
-      <p:sp>
-        <p:nvSpPr>
-          <p:cNvPr id="11" name="TextBox 10"/>
-          <p:cNvSpPr txBox="1"/>
-          <p:nvPr/>
-        </p:nvSpPr>
-        <p:spPr>
-          <a:xfrm>
-            <a:off x="2826142" y="4747376"/>
-            <a:ext cx="5151333" cy="369332"/>
-          </a:xfrm>
-          <a:prstGeom prst="rect">
-            <a:avLst/>
-          </a:prstGeom>
-          <a:noFill/>
-        </p:spPr>
-        <p:txBody>
-          <a:bodyPr wrap="square" rtlCol="0">
-            <a:spAutoFit/>
-          </a:bodyPr>
-          <a:lstStyle/>
-          <a:p>
-            <a:pPr algn="ctr"/>
+              <a:t>Create new integration</a:t>
+            </a:r>
+          </a:p>
+          <a:p>
             <a:r>
               <a:rPr lang="en-US" dirty="0"/>
-              <a:t>that includes a conversation id and </a:t>
-            </a:r>
-            <a:r>
-              <a:rPr lang="en-US"/>
-              <a:t>a channel id</a:t>
-            </a:r>
+              <a:t>+ Action filters (review request, code changed, etc.)</a:t>
+            </a:r>
+          </a:p>
+          <a:p>
             <a:endParaRPr lang="en-US" dirty="0"/>
+          </a:p>
+          <a:p>
+            <a:r>
+              <a:rPr lang="en-US" dirty="0"/>
+              <a:t>Edit and remove integration</a:t>
+            </a:r>
           </a:p>
         </p:txBody>
       </p:sp>
     </p:spTree>
     <p:extLst>
       <p:ext uri="{BB962C8B-B14F-4D97-AF65-F5344CB8AC3E}">
-        <p14:creationId xmlns:p14="http://schemas.microsoft.com/office/powerpoint/2010/main" val="828466624"/>
+        <p14:creationId xmlns:p14="http://schemas.microsoft.com/office/powerpoint/2010/main" val="645351926"/>
       </p:ext>
     </p:extLst>
   </p:cSld>
@@ -3533,7 +3582,40 @@
         </p:nvCxnSpPr>
         <p:spPr>
           <a:xfrm>
-            <a:off x="1238865" y="1041360"/>
+            <a:off x="1238865" y="980768"/>
+            <a:ext cx="0" cy="5427406"/>
+          </a:xfrm>
+          <a:prstGeom prst="line">
+            <a:avLst/>
+          </a:prstGeom>
+          <a:ln w="38100"/>
+        </p:spPr>
+        <p:style>
+          <a:lnRef idx="1">
+            <a:schemeClr val="accent1"/>
+          </a:lnRef>
+          <a:fillRef idx="0">
+            <a:schemeClr val="accent1"/>
+          </a:fillRef>
+          <a:effectRef idx="0">
+            <a:schemeClr val="accent1"/>
+          </a:effectRef>
+          <a:fontRef idx="minor">
+            <a:schemeClr val="tx1"/>
+          </a:fontRef>
+        </p:style>
+      </p:cxnSp>
+      <p:cxnSp>
+        <p:nvCxnSpPr>
+          <p:cNvPr id="8" name="Straight Connector 7"/>
+          <p:cNvCxnSpPr>
+            <a:cxnSpLocks/>
+          </p:cNvCxnSpPr>
+          <p:nvPr/>
+        </p:nvCxnSpPr>
+        <p:spPr>
+          <a:xfrm>
+            <a:off x="10387781" y="980768"/>
             <a:ext cx="0" cy="5427406"/>
           </a:xfrm>
           <a:prstGeom prst="line">
@@ -3566,7 +3648,7 @@
         </p:nvCxnSpPr>
         <p:spPr>
           <a:xfrm>
-            <a:off x="9453076" y="842346"/>
+            <a:off x="6007510" y="980768"/>
             <a:ext cx="0" cy="5427406"/>
           </a:xfrm>
           <a:prstGeom prst="line">
@@ -3597,7 +3679,7 @@
         </p:nvSpPr>
         <p:spPr>
           <a:xfrm>
-            <a:off x="921775" y="565347"/>
+            <a:off x="785352" y="586977"/>
             <a:ext cx="907025" cy="369332"/>
           </a:xfrm>
           <a:prstGeom prst="rect">
@@ -3611,6 +3693,7 @@
           </a:bodyPr>
           <a:lstStyle/>
           <a:p>
+            <a:pPr algn="ctr"/>
             <a:r>
               <a:rPr lang="en-US" dirty="0"/>
               <a:t>User</a:t>
@@ -3620,13 +3703,13 @@
       </p:sp>
       <p:sp>
         <p:nvSpPr>
-          <p:cNvPr id="12" name="TextBox 11"/>
+          <p:cNvPr id="11" name="TextBox 10"/>
           <p:cNvSpPr txBox="1"/>
           <p:nvPr/>
         </p:nvSpPr>
         <p:spPr>
           <a:xfrm>
-            <a:off x="8695992" y="401894"/>
+            <a:off x="9630697" y="549525"/>
             <a:ext cx="1514167" cy="369332"/>
           </a:xfrm>
           <a:prstGeom prst="rect">
@@ -3645,20 +3728,55 @@
               <a:rPr lang="en-US" dirty="0" err="1"/>
               <a:t>ReviewBoard</a:t>
             </a:r>
-            <a:endParaRPr lang="en-US" dirty="0"/>
+            <a:r>
+              <a:rPr lang="en-US" dirty="0"/>
+              <a:t> </a:t>
+            </a:r>
+          </a:p>
+        </p:txBody>
+      </p:sp>
+      <p:sp>
+        <p:nvSpPr>
+          <p:cNvPr id="12" name="TextBox 11"/>
+          <p:cNvSpPr txBox="1"/>
+          <p:nvPr/>
+        </p:nvSpPr>
+        <p:spPr>
+          <a:xfrm>
+            <a:off x="5606846" y="549525"/>
+            <a:ext cx="801328" cy="369332"/>
+          </a:xfrm>
+          <a:prstGeom prst="rect">
+            <a:avLst/>
+          </a:prstGeom>
+          <a:noFill/>
+        </p:spPr>
+        <p:txBody>
+          <a:bodyPr wrap="square" rtlCol="0">
+            <a:spAutoFit/>
+          </a:bodyPr>
+          <a:lstStyle/>
+          <a:p>
+            <a:pPr algn="ctr"/>
+            <a:r>
+              <a:rPr lang="en-US" dirty="0"/>
+              <a:t>Bot</a:t>
+            </a:r>
           </a:p>
         </p:txBody>
       </p:sp>
       <p:cxnSp>
         <p:nvCxnSpPr>
-          <p:cNvPr id="3" name="Straight Arrow Connector 2"/>
-          <p:cNvCxnSpPr/>
+          <p:cNvPr id="13" name="Straight Arrow Connector 12"/>
+          <p:cNvCxnSpPr>
+            <a:cxnSpLocks/>
+          </p:cNvCxnSpPr>
           <p:nvPr/>
         </p:nvCxnSpPr>
         <p:spPr>
           <a:xfrm>
-            <a:off x="1633115" y="2077064"/>
-            <a:ext cx="7537389" cy="0"/>
+            <a:off x="1519084" y="2253075"/>
+            <a:ext cx="8745795" cy="0"/>
           </a:xfrm>
           <a:prstGeom prst="straightConnector1">
             <a:avLst/>
@@ -3684,14 +3802,14 @@
       </p:cxnSp>
       <p:sp>
         <p:nvSpPr>
-          <p:cNvPr id="11" name="TextBox 10"/>
+          <p:cNvPr id="14" name="TextBox 13"/>
           <p:cNvSpPr txBox="1"/>
           <p:nvPr/>
         </p:nvSpPr>
         <p:spPr>
           <a:xfrm>
-            <a:off x="0" y="32562"/>
-            <a:ext cx="4151671" cy="369332"/>
+            <a:off x="1627240" y="4845095"/>
+            <a:ext cx="4019444" cy="369332"/>
           </a:xfrm>
           <a:prstGeom prst="rect">
             <a:avLst/>
@@ -3704,112 +3822,33 @@
           </a:bodyPr>
           <a:lstStyle/>
           <a:p>
-            <a:r>
-              <a:rPr lang="en-US" b="1" dirty="0"/>
-              <a:t>User and </a:t>
-            </a:r>
-            <a:r>
-              <a:rPr lang="en-US" b="1" dirty="0" err="1"/>
-              <a:t>ReviewBoard</a:t>
-            </a:r>
-            <a:r>
-              <a:rPr lang="en-US" b="1" dirty="0"/>
-              <a:t> Interaction</a:t>
-            </a:r>
-          </a:p>
-        </p:txBody>
-      </p:sp>
-      <p:sp>
-        <p:nvSpPr>
-          <p:cNvPr id="13" name="TextBox 12"/>
-          <p:cNvSpPr txBox="1"/>
-          <p:nvPr/>
-        </p:nvSpPr>
-        <p:spPr>
-          <a:xfrm>
-            <a:off x="2426082" y="2203787"/>
-            <a:ext cx="5839777" cy="1200329"/>
-          </a:xfrm>
-          <a:prstGeom prst="rect">
-            <a:avLst/>
-          </a:prstGeom>
-          <a:noFill/>
-        </p:spPr>
-        <p:txBody>
-          <a:bodyPr wrap="square" rtlCol="0">
-            <a:spAutoFit/>
-          </a:bodyPr>
-          <a:lstStyle/>
-          <a:p>
+            <a:pPr algn="ctr"/>
             <a:r>
               <a:rPr lang="en-US" dirty="0"/>
-              <a:t>Create new integration</a:t>
-            </a:r>
-          </a:p>
-          <a:p>
-            <a:r>
-              <a:rPr lang="en-US" dirty="0"/>
-              <a:t>+ Action filters (review request, code changed, etc.)</a:t>
-            </a:r>
-          </a:p>
-          <a:p>
-            <a:endParaRPr lang="en-US" dirty="0"/>
-          </a:p>
-          <a:p>
-            <a:r>
-              <a:rPr lang="en-US" dirty="0"/>
-              <a:t>Edit and remove integration</a:t>
-            </a:r>
-          </a:p>
-        </p:txBody>
-      </p:sp>
-    </p:spTree>
-    <p:extLst>
-      <p:ext uri="{BB962C8B-B14F-4D97-AF65-F5344CB8AC3E}">
-        <p14:creationId xmlns:p14="http://schemas.microsoft.com/office/powerpoint/2010/main" val="645351926"/>
-      </p:ext>
-    </p:extLst>
-  </p:cSld>
-  <p:clrMapOvr>
-    <a:masterClrMapping/>
-  </p:clrMapOvr>
-</p:sld>
-</file>
-
-<file path=ppt/slides/slide4.xml><?xml version="1.0" encoding="utf-8"?>
-<p:sld xmlns:a="http://schemas.openxmlformats.org/drawingml/2006/main" xmlns:r="http://schemas.openxmlformats.org/officeDocument/2006/relationships" xmlns:p="http://schemas.openxmlformats.org/presentationml/2006/main">
-  <p:cSld>
-    <p:spTree>
-      <p:nvGrpSpPr>
-        <p:cNvPr id="1" name=""/>
-        <p:cNvGrpSpPr/>
-        <p:nvPr/>
-      </p:nvGrpSpPr>
-      <p:grpSpPr>
-        <a:xfrm>
-          <a:off x="0" y="0"/>
-          <a:ext cx="0" cy="0"/>
-          <a:chOff x="0" y="0"/>
-          <a:chExt cx="0" cy="0"/>
-        </a:xfrm>
-      </p:grpSpPr>
+              <a:t>User notification on defined channel</a:t>
+            </a:r>
+          </a:p>
+        </p:txBody>
+      </p:sp>
       <p:cxnSp>
         <p:nvCxnSpPr>
-          <p:cNvPr id="5" name="Straight Connector 4"/>
+          <p:cNvPr id="15" name="Straight Arrow Connector 14"/>
           <p:cNvCxnSpPr>
             <a:cxnSpLocks/>
           </p:cNvCxnSpPr>
           <p:nvPr/>
         </p:nvCxnSpPr>
         <p:spPr>
-          <a:xfrm>
-            <a:off x="1238865" y="980768"/>
-            <a:ext cx="0" cy="5427406"/>
-          </a:xfrm>
-          <a:prstGeom prst="line">
+          <a:xfrm flipH="1">
+            <a:off x="6084193" y="3288857"/>
+            <a:ext cx="4168879" cy="0"/>
+          </a:xfrm>
+          <a:prstGeom prst="straightConnector1">
             <a:avLst/>
           </a:prstGeom>
-          <a:ln w="38100"/>
+          <a:ln w="76200">
+            <a:tailEnd type="triangle"/>
+          </a:ln>
         </p:spPr>
         <p:style>
           <a:lnRef idx="1">
@@ -3826,82 +3865,16 @@
           </a:fontRef>
         </p:style>
       </p:cxnSp>
-      <p:cxnSp>
-        <p:nvCxnSpPr>
-          <p:cNvPr id="8" name="Straight Connector 7"/>
-          <p:cNvCxnSpPr>
-            <a:cxnSpLocks/>
-          </p:cNvCxnSpPr>
-          <p:nvPr/>
-        </p:nvCxnSpPr>
-        <p:spPr>
-          <a:xfrm>
-            <a:off x="10387781" y="980768"/>
-            <a:ext cx="0" cy="5427406"/>
-          </a:xfrm>
-          <a:prstGeom prst="line">
-            <a:avLst/>
-          </a:prstGeom>
-          <a:ln w="38100"/>
-        </p:spPr>
-        <p:style>
-          <a:lnRef idx="1">
-            <a:schemeClr val="accent1"/>
-          </a:lnRef>
-          <a:fillRef idx="0">
-            <a:schemeClr val="accent1"/>
-          </a:fillRef>
-          <a:effectRef idx="0">
-            <a:schemeClr val="accent1"/>
-          </a:effectRef>
-          <a:fontRef idx="minor">
-            <a:schemeClr val="tx1"/>
-          </a:fontRef>
-        </p:style>
-      </p:cxnSp>
-      <p:cxnSp>
-        <p:nvCxnSpPr>
-          <p:cNvPr id="9" name="Straight Connector 8"/>
-          <p:cNvCxnSpPr>
-            <a:cxnSpLocks/>
-          </p:cNvCxnSpPr>
-          <p:nvPr/>
-        </p:nvCxnSpPr>
-        <p:spPr>
-          <a:xfrm>
-            <a:off x="6007510" y="980768"/>
-            <a:ext cx="0" cy="5427406"/>
-          </a:xfrm>
-          <a:prstGeom prst="line">
-            <a:avLst/>
-          </a:prstGeom>
-          <a:ln w="38100"/>
-        </p:spPr>
-        <p:style>
-          <a:lnRef idx="1">
-            <a:schemeClr val="accent1"/>
-          </a:lnRef>
-          <a:fillRef idx="0">
-            <a:schemeClr val="accent1"/>
-          </a:fillRef>
-          <a:effectRef idx="0">
-            <a:schemeClr val="accent1"/>
-          </a:effectRef>
-          <a:fontRef idx="minor">
-            <a:schemeClr val="tx1"/>
-          </a:fontRef>
-        </p:style>
-      </p:cxnSp>
-      <p:sp>
-        <p:nvSpPr>
-          <p:cNvPr id="10" name="TextBox 9"/>
+      <p:sp>
+        <p:nvSpPr>
+          <p:cNvPr id="16" name="TextBox 15"/>
           <p:cNvSpPr txBox="1"/>
           <p:nvPr/>
         </p:nvSpPr>
         <p:spPr>
           <a:xfrm>
-            <a:off x="785352" y="586977"/>
-            <a:ext cx="907025" cy="369332"/>
+            <a:off x="6503560" y="3288857"/>
+            <a:ext cx="3541588" cy="646331"/>
           </a:xfrm>
           <a:prstGeom prst="rect">
             <a:avLst/>
@@ -3917,200 +3890,6 @@
             <a:pPr algn="ctr"/>
             <a:r>
               <a:rPr lang="en-US" dirty="0"/>
-              <a:t>User</a:t>
-            </a:r>
-          </a:p>
-        </p:txBody>
-      </p:sp>
-      <p:sp>
-        <p:nvSpPr>
-          <p:cNvPr id="11" name="TextBox 10"/>
-          <p:cNvSpPr txBox="1"/>
-          <p:nvPr/>
-        </p:nvSpPr>
-        <p:spPr>
-          <a:xfrm>
-            <a:off x="9630697" y="549525"/>
-            <a:ext cx="1514167" cy="369332"/>
-          </a:xfrm>
-          <a:prstGeom prst="rect">
-            <a:avLst/>
-          </a:prstGeom>
-          <a:noFill/>
-        </p:spPr>
-        <p:txBody>
-          <a:bodyPr wrap="square" rtlCol="0">
-            <a:spAutoFit/>
-          </a:bodyPr>
-          <a:lstStyle/>
-          <a:p>
-            <a:pPr algn="ctr"/>
-            <a:r>
-              <a:rPr lang="en-US" dirty="0" err="1"/>
-              <a:t>ReviewBoard</a:t>
-            </a:r>
-            <a:r>
-              <a:rPr lang="en-US" dirty="0"/>
-              <a:t> </a:t>
-            </a:r>
-          </a:p>
-        </p:txBody>
-      </p:sp>
-      <p:sp>
-        <p:nvSpPr>
-          <p:cNvPr id="12" name="TextBox 11"/>
-          <p:cNvSpPr txBox="1"/>
-          <p:nvPr/>
-        </p:nvSpPr>
-        <p:spPr>
-          <a:xfrm>
-            <a:off x="5606846" y="549525"/>
-            <a:ext cx="801328" cy="369332"/>
-          </a:xfrm>
-          <a:prstGeom prst="rect">
-            <a:avLst/>
-          </a:prstGeom>
-          <a:noFill/>
-        </p:spPr>
-        <p:txBody>
-          <a:bodyPr wrap="square" rtlCol="0">
-            <a:spAutoFit/>
-          </a:bodyPr>
-          <a:lstStyle/>
-          <a:p>
-            <a:pPr algn="ctr"/>
-            <a:r>
-              <a:rPr lang="en-US" dirty="0"/>
-              <a:t>Bot</a:t>
-            </a:r>
-          </a:p>
-        </p:txBody>
-      </p:sp>
-      <p:cxnSp>
-        <p:nvCxnSpPr>
-          <p:cNvPr id="13" name="Straight Arrow Connector 12"/>
-          <p:cNvCxnSpPr>
-            <a:cxnSpLocks/>
-          </p:cNvCxnSpPr>
-          <p:nvPr/>
-        </p:nvCxnSpPr>
-        <p:spPr>
-          <a:xfrm>
-            <a:off x="1519084" y="2253075"/>
-            <a:ext cx="8745795" cy="0"/>
-          </a:xfrm>
-          <a:prstGeom prst="straightConnector1">
-            <a:avLst/>
-          </a:prstGeom>
-          <a:ln w="76200">
-            <a:tailEnd type="triangle"/>
-          </a:ln>
-        </p:spPr>
-        <p:style>
-          <a:lnRef idx="1">
-            <a:schemeClr val="accent1"/>
-          </a:lnRef>
-          <a:fillRef idx="0">
-            <a:schemeClr val="accent1"/>
-          </a:fillRef>
-          <a:effectRef idx="0">
-            <a:schemeClr val="accent1"/>
-          </a:effectRef>
-          <a:fontRef idx="minor">
-            <a:schemeClr val="tx1"/>
-          </a:fontRef>
-        </p:style>
-      </p:cxnSp>
-      <p:sp>
-        <p:nvSpPr>
-          <p:cNvPr id="14" name="TextBox 13"/>
-          <p:cNvSpPr txBox="1"/>
-          <p:nvPr/>
-        </p:nvSpPr>
-        <p:spPr>
-          <a:xfrm>
-            <a:off x="1627240" y="4845095"/>
-            <a:ext cx="4019444" cy="369332"/>
-          </a:xfrm>
-          <a:prstGeom prst="rect">
-            <a:avLst/>
-          </a:prstGeom>
-          <a:noFill/>
-        </p:spPr>
-        <p:txBody>
-          <a:bodyPr wrap="square" rtlCol="0">
-            <a:spAutoFit/>
-          </a:bodyPr>
-          <a:lstStyle/>
-          <a:p>
-            <a:pPr algn="ctr"/>
-            <a:r>
-              <a:rPr lang="en-US" dirty="0"/>
-              <a:t>User notification on defined channel</a:t>
-            </a:r>
-          </a:p>
-        </p:txBody>
-      </p:sp>
-      <p:cxnSp>
-        <p:nvCxnSpPr>
-          <p:cNvPr id="15" name="Straight Arrow Connector 14"/>
-          <p:cNvCxnSpPr>
-            <a:cxnSpLocks/>
-          </p:cNvCxnSpPr>
-          <p:nvPr/>
-        </p:nvCxnSpPr>
-        <p:spPr>
-          <a:xfrm flipH="1">
-            <a:off x="6084193" y="3288857"/>
-            <a:ext cx="4168879" cy="0"/>
-          </a:xfrm>
-          <a:prstGeom prst="straightConnector1">
-            <a:avLst/>
-          </a:prstGeom>
-          <a:ln w="76200">
-            <a:tailEnd type="triangle"/>
-          </a:ln>
-        </p:spPr>
-        <p:style>
-          <a:lnRef idx="1">
-            <a:schemeClr val="accent1"/>
-          </a:lnRef>
-          <a:fillRef idx="0">
-            <a:schemeClr val="accent1"/>
-          </a:fillRef>
-          <a:effectRef idx="0">
-            <a:schemeClr val="accent1"/>
-          </a:effectRef>
-          <a:fontRef idx="minor">
-            <a:schemeClr val="tx1"/>
-          </a:fontRef>
-        </p:style>
-      </p:cxnSp>
-      <p:sp>
-        <p:nvSpPr>
-          <p:cNvPr id="16" name="TextBox 15"/>
-          <p:cNvSpPr txBox="1"/>
-          <p:nvPr/>
-        </p:nvSpPr>
-        <p:spPr>
-          <a:xfrm>
-            <a:off x="6503560" y="3288857"/>
-            <a:ext cx="3379304" cy="923330"/>
-          </a:xfrm>
-          <a:prstGeom prst="rect">
-            <a:avLst/>
-          </a:prstGeom>
-          <a:noFill/>
-        </p:spPr>
-        <p:txBody>
-          <a:bodyPr wrap="square" rtlCol="0">
-            <a:spAutoFit/>
-          </a:bodyPr>
-          <a:lstStyle/>
-          <a:p>
-            <a:pPr algn="ctr"/>
-            <a:r>
-              <a:rPr lang="en-US" dirty="0"/>
               <a:t>POST http://[bot URL]/</a:t>
             </a:r>
             <a:r>
@@ -4123,15 +3902,7 @@
             </a:r>
             <a:r>
               <a:rPr lang="en-US" dirty="0" err="1"/>
-              <a:t>conversationId</a:t>
-            </a:r>
-            <a:r>
-              <a:rPr lang="en-US" dirty="0"/>
-              <a:t>}/{</a:t>
-            </a:r>
-            <a:r>
-              <a:rPr lang="en-US" dirty="0" err="1"/>
-              <a:t>channelId</a:t>
+              <a:t>encoded_address</a:t>
             </a:r>
             <a:r>
               <a:rPr lang="en-US" dirty="0"/>

</xml_diff>